<commit_message>
added basic structure of the presentation
/
</commit_message>
<xml_diff>
--- a/presentation/Test.pptx
+++ b/presentation/Test.pptx
@@ -5,10 +5,11 @@
     <p:sldMasterId id="2147483648" r:id="rId1"/>
   </p:sldMasterIdLst>
   <p:notesMasterIdLst>
-    <p:notesMasterId r:id="rId3"/>
+    <p:notesMasterId r:id="rId4"/>
   </p:notesMasterIdLst>
   <p:sldIdLst>
     <p:sldId id="256" r:id="rId2"/>
+    <p:sldId id="257" r:id="rId3"/>
   </p:sldIdLst>
   <p:sldSz cx="9144000" cy="6858000" type="screen4x3"/>
   <p:notesSz cx="6858000" cy="9144000"/>
@@ -192,6 +193,7 @@
           <a:p>
             <a:fld id="{9DE2D76F-6026-4EEA-8175-1DA3F2774ED6}" type="datetimeFigureOut">
               <a:rPr lang="de-CH" smtClean="0"/>
+              <a:pPr/>
               <a:t>13.12.2014</a:t>
             </a:fld>
             <a:endParaRPr lang="de-CH"/>
@@ -353,6 +355,7 @@
           <a:p>
             <a:fld id="{58654A3D-C737-4BEA-88C0-1DAB192ED2AD}" type="slidenum">
               <a:rPr lang="de-CH" smtClean="0"/>
+              <a:pPr/>
               <a:t>‹Nr.›</a:t>
             </a:fld>
             <a:endParaRPr lang="de-CH"/>
@@ -524,7 +527,90 @@
           <a:p>
             <a:fld id="{58654A3D-C737-4BEA-88C0-1DAB192ED2AD}" type="slidenum">
               <a:rPr lang="de-CH" smtClean="0"/>
+              <a:pPr/>
               <a:t>1</a:t>
+            </a:fld>
+            <a:endParaRPr lang="de-CH"/>
+          </a:p>
+        </p:txBody>
+      </p:sp>
+    </p:spTree>
+  </p:cSld>
+  <p:clrMapOvr>
+    <a:masterClrMapping/>
+  </p:clrMapOvr>
+</p:notes>
+</file>
+
+<file path=ppt/notesSlides/notesSlide2.xml><?xml version="1.0" encoding="utf-8"?>
+<p:notes xmlns:a="http://schemas.openxmlformats.org/drawingml/2006/main" xmlns:r="http://schemas.openxmlformats.org/officeDocument/2006/relationships" xmlns:p="http://schemas.openxmlformats.org/presentationml/2006/main">
+  <p:cSld>
+    <p:spTree>
+      <p:nvGrpSpPr>
+        <p:cNvPr id="1" name=""/>
+        <p:cNvGrpSpPr/>
+        <p:nvPr/>
+      </p:nvGrpSpPr>
+      <p:grpSpPr>
+        <a:xfrm>
+          <a:off x="0" y="0"/>
+          <a:ext cx="0" cy="0"/>
+          <a:chOff x="0" y="0"/>
+          <a:chExt cx="0" cy="0"/>
+        </a:xfrm>
+      </p:grpSpPr>
+      <p:sp>
+        <p:nvSpPr>
+          <p:cNvPr id="2" name="Folienbildplatzhalter 1"/>
+          <p:cNvSpPr>
+            <a:spLocks noGrp="1" noRot="1" noChangeAspect="1"/>
+          </p:cNvSpPr>
+          <p:nvPr>
+            <p:ph type="sldImg"/>
+          </p:nvPr>
+        </p:nvSpPr>
+        <p:spPr/>
+      </p:sp>
+      <p:sp>
+        <p:nvSpPr>
+          <p:cNvPr id="3" name="Notizenplatzhalter 2"/>
+          <p:cNvSpPr>
+            <a:spLocks noGrp="1"/>
+          </p:cNvSpPr>
+          <p:nvPr>
+            <p:ph type="body" idx="1"/>
+          </p:nvPr>
+        </p:nvSpPr>
+        <p:spPr/>
+        <p:txBody>
+          <a:bodyPr>
+            <a:normAutofit/>
+          </a:bodyPr>
+          <a:lstStyle/>
+          <a:p>
+            <a:endParaRPr lang="de-CH"/>
+          </a:p>
+        </p:txBody>
+      </p:sp>
+      <p:sp>
+        <p:nvSpPr>
+          <p:cNvPr id="4" name="Foliennummernplatzhalter 3"/>
+          <p:cNvSpPr>
+            <a:spLocks noGrp="1"/>
+          </p:cNvSpPr>
+          <p:nvPr>
+            <p:ph type="sldNum" sz="quarter" idx="10"/>
+          </p:nvPr>
+        </p:nvSpPr>
+        <p:spPr/>
+        <p:txBody>
+          <a:bodyPr/>
+          <a:lstStyle/>
+          <a:p>
+            <a:fld id="{58654A3D-C737-4BEA-88C0-1DAB192ED2AD}" type="slidenum">
+              <a:rPr lang="de-CH" smtClean="0"/>
+              <a:pPr/>
+              <a:t>2</a:t>
             </a:fld>
             <a:endParaRPr lang="de-CH"/>
           </a:p>
@@ -719,6 +805,7 @@
           <a:p>
             <a:fld id="{39077870-AC76-45C5-96DF-2BD0250DF6B2}" type="datetimeFigureOut">
               <a:rPr lang="de-CH" smtClean="0"/>
+              <a:pPr/>
               <a:t>13.12.2014</a:t>
             </a:fld>
             <a:endParaRPr lang="de-CH"/>
@@ -761,6 +848,7 @@
           <a:p>
             <a:fld id="{081783D4-C8A0-4BEC-98D7-3236C86E4958}" type="slidenum">
               <a:rPr lang="de-CH" smtClean="0"/>
+              <a:pPr/>
               <a:t>‹Nr.›</a:t>
             </a:fld>
             <a:endParaRPr lang="de-CH"/>
@@ -884,6 +972,7 @@
           <a:p>
             <a:fld id="{39077870-AC76-45C5-96DF-2BD0250DF6B2}" type="datetimeFigureOut">
               <a:rPr lang="de-CH" smtClean="0"/>
+              <a:pPr/>
               <a:t>13.12.2014</a:t>
             </a:fld>
             <a:endParaRPr lang="de-CH"/>
@@ -926,6 +1015,7 @@
           <a:p>
             <a:fld id="{081783D4-C8A0-4BEC-98D7-3236C86E4958}" type="slidenum">
               <a:rPr lang="de-CH" smtClean="0"/>
+              <a:pPr/>
               <a:t>‹Nr.›</a:t>
             </a:fld>
             <a:endParaRPr lang="de-CH"/>
@@ -1059,6 +1149,7 @@
           <a:p>
             <a:fld id="{39077870-AC76-45C5-96DF-2BD0250DF6B2}" type="datetimeFigureOut">
               <a:rPr lang="de-CH" smtClean="0"/>
+              <a:pPr/>
               <a:t>13.12.2014</a:t>
             </a:fld>
             <a:endParaRPr lang="de-CH"/>
@@ -1101,6 +1192,7 @@
           <a:p>
             <a:fld id="{081783D4-C8A0-4BEC-98D7-3236C86E4958}" type="slidenum">
               <a:rPr lang="de-CH" smtClean="0"/>
+              <a:pPr/>
               <a:t>‹Nr.›</a:t>
             </a:fld>
             <a:endParaRPr lang="de-CH"/>
@@ -1224,6 +1316,7 @@
           <a:p>
             <a:fld id="{39077870-AC76-45C5-96DF-2BD0250DF6B2}" type="datetimeFigureOut">
               <a:rPr lang="de-CH" smtClean="0"/>
+              <a:pPr/>
               <a:t>13.12.2014</a:t>
             </a:fld>
             <a:endParaRPr lang="de-CH"/>
@@ -1266,6 +1359,7 @@
           <a:p>
             <a:fld id="{081783D4-C8A0-4BEC-98D7-3236C86E4958}" type="slidenum">
               <a:rPr lang="de-CH" smtClean="0"/>
+              <a:pPr/>
               <a:t>‹Nr.›</a:t>
             </a:fld>
             <a:endParaRPr lang="de-CH"/>
@@ -1465,6 +1559,7 @@
           <a:p>
             <a:fld id="{39077870-AC76-45C5-96DF-2BD0250DF6B2}" type="datetimeFigureOut">
               <a:rPr lang="de-CH" smtClean="0"/>
+              <a:pPr/>
               <a:t>13.12.2014</a:t>
             </a:fld>
             <a:endParaRPr lang="de-CH"/>
@@ -1507,6 +1602,7 @@
           <a:p>
             <a:fld id="{081783D4-C8A0-4BEC-98D7-3236C86E4958}" type="slidenum">
               <a:rPr lang="de-CH" smtClean="0"/>
+              <a:pPr/>
               <a:t>‹Nr.›</a:t>
             </a:fld>
             <a:endParaRPr lang="de-CH"/>
@@ -1748,6 +1844,7 @@
           <a:p>
             <a:fld id="{39077870-AC76-45C5-96DF-2BD0250DF6B2}" type="datetimeFigureOut">
               <a:rPr lang="de-CH" smtClean="0"/>
+              <a:pPr/>
               <a:t>13.12.2014</a:t>
             </a:fld>
             <a:endParaRPr lang="de-CH"/>
@@ -1790,6 +1887,7 @@
           <a:p>
             <a:fld id="{081783D4-C8A0-4BEC-98D7-3236C86E4958}" type="slidenum">
               <a:rPr lang="de-CH" smtClean="0"/>
+              <a:pPr/>
               <a:t>‹Nr.›</a:t>
             </a:fld>
             <a:endParaRPr lang="de-CH"/>
@@ -2165,6 +2263,7 @@
           <a:p>
             <a:fld id="{39077870-AC76-45C5-96DF-2BD0250DF6B2}" type="datetimeFigureOut">
               <a:rPr lang="de-CH" smtClean="0"/>
+              <a:pPr/>
               <a:t>13.12.2014</a:t>
             </a:fld>
             <a:endParaRPr lang="de-CH"/>
@@ -2207,6 +2306,7 @@
           <a:p>
             <a:fld id="{081783D4-C8A0-4BEC-98D7-3236C86E4958}" type="slidenum">
               <a:rPr lang="de-CH" smtClean="0"/>
+              <a:pPr/>
               <a:t>‹Nr.›</a:t>
             </a:fld>
             <a:endParaRPr lang="de-CH"/>
@@ -2278,6 +2378,7 @@
           <a:p>
             <a:fld id="{39077870-AC76-45C5-96DF-2BD0250DF6B2}" type="datetimeFigureOut">
               <a:rPr lang="de-CH" smtClean="0"/>
+              <a:pPr/>
               <a:t>13.12.2014</a:t>
             </a:fld>
             <a:endParaRPr lang="de-CH"/>
@@ -2320,6 +2421,7 @@
           <a:p>
             <a:fld id="{081783D4-C8A0-4BEC-98D7-3236C86E4958}" type="slidenum">
               <a:rPr lang="de-CH" smtClean="0"/>
+              <a:pPr/>
               <a:t>‹Nr.›</a:t>
             </a:fld>
             <a:endParaRPr lang="de-CH"/>
@@ -2368,6 +2470,7 @@
           <a:p>
             <a:fld id="{39077870-AC76-45C5-96DF-2BD0250DF6B2}" type="datetimeFigureOut">
               <a:rPr lang="de-CH" smtClean="0"/>
+              <a:pPr/>
               <a:t>13.12.2014</a:t>
             </a:fld>
             <a:endParaRPr lang="de-CH"/>
@@ -2410,6 +2513,7 @@
           <a:p>
             <a:fld id="{081783D4-C8A0-4BEC-98D7-3236C86E4958}" type="slidenum">
               <a:rPr lang="de-CH" smtClean="0"/>
+              <a:pPr/>
               <a:t>‹Nr.›</a:t>
             </a:fld>
             <a:endParaRPr lang="de-CH"/>
@@ -2640,6 +2744,7 @@
           <a:p>
             <a:fld id="{39077870-AC76-45C5-96DF-2BD0250DF6B2}" type="datetimeFigureOut">
               <a:rPr lang="de-CH" smtClean="0"/>
+              <a:pPr/>
               <a:t>13.12.2014</a:t>
             </a:fld>
             <a:endParaRPr lang="de-CH"/>
@@ -2682,6 +2787,7 @@
           <a:p>
             <a:fld id="{081783D4-C8A0-4BEC-98D7-3236C86E4958}" type="slidenum">
               <a:rPr lang="de-CH" smtClean="0"/>
+              <a:pPr/>
               <a:t>‹Nr.›</a:t>
             </a:fld>
             <a:endParaRPr lang="de-CH"/>
@@ -2888,6 +2994,7 @@
           <a:p>
             <a:fld id="{39077870-AC76-45C5-96DF-2BD0250DF6B2}" type="datetimeFigureOut">
               <a:rPr lang="de-CH" smtClean="0"/>
+              <a:pPr/>
               <a:t>13.12.2014</a:t>
             </a:fld>
             <a:endParaRPr lang="de-CH"/>
@@ -2930,6 +3037,7 @@
           <a:p>
             <a:fld id="{081783D4-C8A0-4BEC-98D7-3236C86E4958}" type="slidenum">
               <a:rPr lang="de-CH" smtClean="0"/>
+              <a:pPr/>
               <a:t>‹Nr.›</a:t>
             </a:fld>
             <a:endParaRPr lang="de-CH"/>
@@ -3096,6 +3204,7 @@
           <a:p>
             <a:fld id="{39077870-AC76-45C5-96DF-2BD0250DF6B2}" type="datetimeFigureOut">
               <a:rPr lang="de-CH" smtClean="0"/>
+              <a:pPr/>
               <a:t>13.12.2014</a:t>
             </a:fld>
             <a:endParaRPr lang="de-CH"/>
@@ -3174,6 +3283,7 @@
           <a:p>
             <a:fld id="{081783D4-C8A0-4BEC-98D7-3236C86E4958}" type="slidenum">
               <a:rPr lang="de-CH" smtClean="0"/>
+              <a:pPr/>
               <a:t>‹Nr.›</a:t>
             </a:fld>
             <a:endParaRPr lang="de-CH"/>
@@ -3478,14 +3588,16 @@
         </p:nvSpPr>
         <p:spPr/>
         <p:txBody>
-          <a:bodyPr/>
-          <a:lstStyle/>
-          <a:p>
-            <a:r>
-              <a:rPr lang="de-CH" smtClean="0"/>
+          <a:bodyPr>
+            <a:normAutofit/>
+          </a:bodyPr>
+          <a:lstStyle/>
+          <a:p>
+            <a:r>
+              <a:rPr lang="de-CH" dirty="0" smtClean="0"/>
               <a:t>Test</a:t>
             </a:r>
-            <a:endParaRPr lang="de-CH"/>
+            <a:endParaRPr lang="de-CH" dirty="0"/>
           </a:p>
         </p:txBody>
       </p:sp>
@@ -3504,7 +3616,217 @@
           <a:bodyPr/>
           <a:lstStyle/>
           <a:p>
-            <a:endParaRPr lang="de-CH"/>
+            <a:endParaRPr lang="de-CH" dirty="0"/>
+          </a:p>
+        </p:txBody>
+      </p:sp>
+    </p:spTree>
+  </p:cSld>
+  <p:clrMapOvr>
+    <a:masterClrMapping/>
+  </p:clrMapOvr>
+</p:sld>
+</file>
+
+<file path=ppt/slides/slide2.xml><?xml version="1.0" encoding="utf-8"?>
+<p:sld xmlns:a="http://schemas.openxmlformats.org/drawingml/2006/main" xmlns:r="http://schemas.openxmlformats.org/officeDocument/2006/relationships" xmlns:p="http://schemas.openxmlformats.org/presentationml/2006/main">
+  <p:cSld>
+    <p:spTree>
+      <p:nvGrpSpPr>
+        <p:cNvPr id="1" name=""/>
+        <p:cNvGrpSpPr/>
+        <p:nvPr/>
+      </p:nvGrpSpPr>
+      <p:grpSpPr>
+        <a:xfrm>
+          <a:off x="0" y="0"/>
+          <a:ext cx="0" cy="0"/>
+          <a:chOff x="0" y="0"/>
+          <a:chExt cx="0" cy="0"/>
+        </a:xfrm>
+      </p:grpSpPr>
+      <p:sp>
+        <p:nvSpPr>
+          <p:cNvPr id="2" name="Titel 1"/>
+          <p:cNvSpPr>
+            <a:spLocks noGrp="1"/>
+          </p:cNvSpPr>
+          <p:nvPr>
+            <p:ph type="title"/>
+          </p:nvPr>
+        </p:nvSpPr>
+        <p:spPr/>
+        <p:txBody>
+          <a:bodyPr>
+            <a:normAutofit fontScale="90000"/>
+          </a:bodyPr>
+          <a:lstStyle/>
+          <a:p>
+            <a:r>
+              <a:rPr lang="en-US" dirty="0" smtClean="0"/>
+              <a:t>General structure of the talk </a:t>
+            </a:r>
+            <a:br>
+              <a:rPr lang="en-US" dirty="0" smtClean="0"/>
+            </a:br>
+            <a:endParaRPr lang="de-CH" dirty="0"/>
+          </a:p>
+        </p:txBody>
+      </p:sp>
+      <p:sp>
+        <p:nvSpPr>
+          <p:cNvPr id="3" name="Inhaltsplatzhalter 2"/>
+          <p:cNvSpPr>
+            <a:spLocks noGrp="1"/>
+          </p:cNvSpPr>
+          <p:nvPr>
+            <p:ph idx="1"/>
+          </p:nvPr>
+        </p:nvSpPr>
+        <p:spPr/>
+        <p:txBody>
+          <a:bodyPr>
+            <a:normAutofit fontScale="25000" lnSpcReduction="20000"/>
+          </a:bodyPr>
+          <a:lstStyle/>
+          <a:p>
+            <a:r>
+              <a:rPr lang="en-US" sz="7400" b="1" dirty="0" smtClean="0"/>
+              <a:t>1. Start </a:t>
+            </a:r>
+            <a:r>
+              <a:rPr lang="en-US" sz="7400" b="1" dirty="0" smtClean="0"/>
+              <a:t>with a general motivation or story. </a:t>
+            </a:r>
+          </a:p>
+          <a:p>
+            <a:pPr lvl="1"/>
+            <a:r>
+              <a:rPr lang="en-US" sz="7000" dirty="0" smtClean="0"/>
+              <a:t>Connect </a:t>
+            </a:r>
+            <a:r>
+              <a:rPr lang="en-US" sz="7000" dirty="0" smtClean="0"/>
+              <a:t>to the specific context of this talk. </a:t>
+            </a:r>
+          </a:p>
+          <a:p>
+            <a:r>
+              <a:rPr lang="en-US" sz="7400" b="1" dirty="0" smtClean="0"/>
+              <a:t>2.Introduction </a:t>
+            </a:r>
+            <a:endParaRPr lang="en-US" sz="7400" b="1" dirty="0" smtClean="0"/>
+          </a:p>
+          <a:p>
+            <a:pPr lvl="1"/>
+            <a:r>
+              <a:rPr lang="en-US" sz="7000" dirty="0" smtClean="0"/>
+              <a:t>Connect </a:t>
+            </a:r>
+            <a:r>
+              <a:rPr lang="en-US" sz="7000" dirty="0" smtClean="0"/>
+              <a:t>to past work in your field. </a:t>
+            </a:r>
+          </a:p>
+          <a:p>
+            <a:pPr lvl="1"/>
+            <a:r>
+              <a:rPr lang="en-US" sz="7000" dirty="0" smtClean="0"/>
+              <a:t>Explain </a:t>
+            </a:r>
+            <a:r>
+              <a:rPr lang="en-US" sz="7000" dirty="0" smtClean="0"/>
+              <a:t>what new insight you are adding. </a:t>
+            </a:r>
+          </a:p>
+          <a:p>
+            <a:r>
+              <a:rPr lang="en-US" sz="7400" b="1" dirty="0" smtClean="0"/>
+              <a:t>3.Results </a:t>
+            </a:r>
+            <a:endParaRPr lang="en-US" sz="7400" b="1" dirty="0" smtClean="0"/>
+          </a:p>
+          <a:p>
+            <a:pPr lvl="1"/>
+            <a:r>
+              <a:rPr lang="en-US" sz="7000" dirty="0" smtClean="0"/>
+              <a:t>Approx</a:t>
+            </a:r>
+            <a:r>
+              <a:rPr lang="en-US" sz="7000" dirty="0" smtClean="0"/>
+              <a:t>. three main results is sufficient. </a:t>
+            </a:r>
+          </a:p>
+          <a:p>
+            <a:pPr lvl="1"/>
+            <a:r>
+              <a:rPr lang="en-US" sz="7000" dirty="0" smtClean="0"/>
+              <a:t>Time </a:t>
+            </a:r>
+            <a:r>
+              <a:rPr lang="en-US" sz="7000" dirty="0" smtClean="0"/>
+              <a:t>you spent presenting a result should not be </a:t>
+            </a:r>
+          </a:p>
+          <a:p>
+            <a:pPr lvl="1"/>
+            <a:r>
+              <a:rPr lang="en-US" sz="7000" dirty="0" smtClean="0"/>
+              <a:t>proportional to time spent working on it! </a:t>
+            </a:r>
+          </a:p>
+          <a:p>
+            <a:r>
+              <a:rPr lang="en-US" sz="7400" b="1" dirty="0" smtClean="0"/>
+              <a:t>4.Conclusion </a:t>
+            </a:r>
+            <a:endParaRPr lang="en-US" sz="7400" b="1" dirty="0" smtClean="0"/>
+          </a:p>
+          <a:p>
+            <a:pPr lvl="1"/>
+            <a:r>
+              <a:rPr lang="en-US" sz="7000" dirty="0" smtClean="0"/>
+              <a:t>Recap </a:t>
+            </a:r>
+            <a:r>
+              <a:rPr lang="en-US" sz="7000" dirty="0" smtClean="0"/>
+              <a:t>main points made. </a:t>
+            </a:r>
+          </a:p>
+          <a:p>
+            <a:pPr lvl="1"/>
+            <a:r>
+              <a:rPr lang="en-US" sz="7000" dirty="0" smtClean="0"/>
+              <a:t>Emphasize </a:t>
+            </a:r>
+            <a:r>
+              <a:rPr lang="en-US" sz="7000" dirty="0" smtClean="0"/>
+              <a:t>the “take-home” message. </a:t>
+            </a:r>
+          </a:p>
+          <a:p>
+            <a:pPr lvl="1"/>
+            <a:r>
+              <a:rPr lang="en-US" sz="7000" dirty="0" smtClean="0"/>
+              <a:t>Echo </a:t>
+            </a:r>
+            <a:r>
+              <a:rPr lang="en-US" sz="7000" dirty="0" smtClean="0"/>
+              <a:t>of introduction as a conclusion can create </a:t>
+            </a:r>
+          </a:p>
+          <a:p>
+            <a:pPr lvl="1"/>
+            <a:r>
+              <a:rPr lang="en-US" sz="7000" dirty="0" smtClean="0"/>
+              <a:t>closure. </a:t>
+            </a:r>
+          </a:p>
+          <a:p>
+            <a:endParaRPr lang="en-US" sz="7400" dirty="0" smtClean="0"/>
+          </a:p>
+          <a:p>
+            <a:endParaRPr lang="de-CH" dirty="0"/>
           </a:p>
         </p:txBody>
       </p:sp>

</xml_diff>